<commit_message>
Expand solutions for EC2 auth & deployment pipeline
</commit_message>
<xml_diff>
--- a/src/section-4-devsecops-pipeline-design/DevSecOpsPipeline.pptx
+++ b/src/section-4-devsecops-pipeline-design/DevSecOpsPipeline.pptx
@@ -5580,7 +5580,7 @@
         <p:spPr>
           <a:xfrm>
             <a:off x="3104514" y="1034410"/>
-            <a:ext cx="1137330" cy="597600"/>
+            <a:ext cx="1137330" cy="794370"/>
           </a:xfrm>
           <a:prstGeom prst="rect">
             <a:avLst/>
@@ -5623,8 +5623,8 @@
         </p:nvSpPr>
         <p:spPr>
           <a:xfrm>
-            <a:off x="7560056" y="4205922"/>
-            <a:ext cx="1195001" cy="597600"/>
+            <a:off x="7361500" y="4205921"/>
+            <a:ext cx="1551006" cy="759617"/>
           </a:xfrm>
           <a:prstGeom prst="rect">
             <a:avLst/>
@@ -5653,7 +5653,27 @@
             </a:pPr>
             <a:r>
               <a:rPr lang="en-GB" sz="1000" dirty="0" smtClean="0"/>
-              <a:t>Continuous Event Monitoring &amp; Threat Detection</a:t>
+              <a:t>Continuous Event Monitoring &amp; Threat </a:t>
+            </a:r>
+            <a:r>
+              <a:rPr lang="en-GB" sz="1000" dirty="0" smtClean="0"/>
+              <a:t>Detection (</a:t>
+            </a:r>
+            <a:r>
+              <a:rPr lang="en-GB" sz="1000" dirty="0" err="1" smtClean="0"/>
+              <a:t>CloudWatch</a:t>
+            </a:r>
+            <a:r>
+              <a:rPr lang="en-GB" sz="1000" dirty="0" smtClean="0"/>
+              <a:t>, WAF, </a:t>
+            </a:r>
+            <a:r>
+              <a:rPr lang="en-GB" sz="1000" dirty="0" err="1" smtClean="0"/>
+              <a:t>GuardDuty</a:t>
+            </a:r>
+            <a:r>
+              <a:rPr lang="en-GB" sz="1000" dirty="0" smtClean="0"/>
+              <a:t>)</a:t>
             </a:r>
             <a:endParaRPr sz="1000" dirty="0"/>
           </a:p>
@@ -5712,7 +5732,7 @@
         <p:spPr>
           <a:xfrm>
             <a:off x="297060" y="1028060"/>
-            <a:ext cx="1137330" cy="597600"/>
+            <a:ext cx="1137330" cy="800720"/>
           </a:xfrm>
           <a:prstGeom prst="rect">
             <a:avLst/>
@@ -5755,8 +5775,8 @@
         </p:nvSpPr>
         <p:spPr>
           <a:xfrm>
-            <a:off x="297060" y="3384408"/>
-            <a:ext cx="1137330" cy="597600"/>
+            <a:off x="319019" y="3169350"/>
+            <a:ext cx="1137330" cy="821513"/>
           </a:xfrm>
           <a:prstGeom prst="rect">
             <a:avLst/>
@@ -5802,8 +5822,8 @@
         </p:nvCxnSpPr>
         <p:spPr>
           <a:xfrm>
-            <a:off x="1434390" y="1326860"/>
-            <a:ext cx="1670124" cy="6350"/>
+            <a:off x="1434390" y="1428420"/>
+            <a:ext cx="1670124" cy="3175"/>
           </a:xfrm>
           <a:prstGeom prst="bentConnector3">
             <a:avLst>
@@ -5833,8 +5853,8 @@
         </p:nvCxnSpPr>
         <p:spPr>
           <a:xfrm flipV="1">
-            <a:off x="1434390" y="2870550"/>
-            <a:ext cx="4425257" cy="812658"/>
+            <a:off x="1456349" y="2870550"/>
+            <a:ext cx="4403298" cy="709557"/>
           </a:xfrm>
           <a:prstGeom prst="bentConnector2">
             <a:avLst/>
@@ -5862,8 +5882,8 @@
         </p:nvCxnSpPr>
         <p:spPr>
           <a:xfrm>
-            <a:off x="4241844" y="1333210"/>
-            <a:ext cx="1617803" cy="939740"/>
+            <a:off x="4241844" y="1431595"/>
+            <a:ext cx="1617803" cy="841355"/>
           </a:xfrm>
           <a:prstGeom prst="bentConnector2">
             <a:avLst/>
@@ -5892,7 +5912,7 @@
         <p:spPr>
           <a:xfrm>
             <a:off x="6458673" y="2571750"/>
-            <a:ext cx="1698884" cy="1634172"/>
+            <a:ext cx="1678330" cy="1634171"/>
           </a:xfrm>
           <a:prstGeom prst="bentConnector2">
             <a:avLst/>
@@ -5917,8 +5937,8 @@
         </p:nvSpPr>
         <p:spPr>
           <a:xfrm>
-            <a:off x="3104514" y="3384408"/>
-            <a:ext cx="1137330" cy="597600"/>
+            <a:off x="2956135" y="3169350"/>
+            <a:ext cx="1372798" cy="821513"/>
           </a:xfrm>
           <a:prstGeom prst="rect">
             <a:avLst/>
@@ -5947,7 +5967,26 @@
             </a:pPr>
             <a:r>
               <a:rPr lang="en-GB" sz="1000" dirty="0" smtClean="0"/>
-              <a:t>Security &amp; Compliance Scan of IAC Templates </a:t>
+              <a:t>Security &amp; Compliance Scan of IAC </a:t>
+            </a:r>
+            <a:r>
+              <a:rPr lang="en-GB" sz="1000" dirty="0" smtClean="0"/>
+              <a:t>Templates</a:t>
+            </a:r>
+            <a:br>
+              <a:rPr lang="en-GB" sz="1000" dirty="0" smtClean="0"/>
+            </a:br>
+            <a:r>
+              <a:rPr lang="en-GB" sz="1000" dirty="0" smtClean="0"/>
+              <a:t>(Regula/</a:t>
+            </a:r>
+            <a:r>
+              <a:rPr lang="en-GB" sz="1000" dirty="0" err="1" smtClean="0"/>
+              <a:t>Cloudsploit</a:t>
+            </a:r>
+            <a:r>
+              <a:rPr lang="en-GB" sz="1000" dirty="0" smtClean="0"/>
+              <a:t>) </a:t>
             </a:r>
             <a:endParaRPr sz="1000" dirty="0"/>
           </a:p>
@@ -5962,7 +6001,7 @@
         <p:spPr>
           <a:xfrm>
             <a:off x="4508241" y="1028040"/>
-            <a:ext cx="1137330" cy="597600"/>
+            <a:ext cx="1137330" cy="800740"/>
           </a:xfrm>
           <a:prstGeom prst="rect">
             <a:avLst/>
@@ -5991,7 +6030,11 @@
             </a:pPr>
             <a:r>
               <a:rPr lang="en-GB" sz="1000" dirty="0" smtClean="0"/>
-              <a:t>Container / Image Scan</a:t>
+              <a:t>Container / Image </a:t>
+            </a:r>
+            <a:r>
+              <a:rPr lang="en-GB" sz="1000" dirty="0" smtClean="0"/>
+              <a:t>Scan (Clair)</a:t>
             </a:r>
             <a:endParaRPr sz="1000" dirty="0"/>
           </a:p>
@@ -6005,8 +6048,8 @@
         </p:nvSpPr>
         <p:spPr>
           <a:xfrm>
-            <a:off x="1700787" y="1028060"/>
-            <a:ext cx="1137330" cy="597600"/>
+            <a:off x="1634188" y="1028040"/>
+            <a:ext cx="1270528" cy="800740"/>
           </a:xfrm>
           <a:prstGeom prst="rect">
             <a:avLst/>
@@ -6035,7 +6078,34 @@
             </a:pPr>
             <a:r>
               <a:rPr lang="en-GB" sz="1000" dirty="0" smtClean="0"/>
-              <a:t>Static Code Analysis &amp; Security Scan</a:t>
+              <a:t>Static Code Analysis &amp; Security </a:t>
+            </a:r>
+            <a:r>
+              <a:rPr lang="en-GB" sz="1000" dirty="0" smtClean="0"/>
+              <a:t>Scan</a:t>
+            </a:r>
+          </a:p>
+          <a:p>
+            <a:pPr marL="0" lvl="0" indent="0" algn="ctr" rtl="0">
+              <a:spcBef>
+                <a:spcPts val="0"/>
+              </a:spcBef>
+              <a:spcAft>
+                <a:spcPts val="0"/>
+              </a:spcAft>
+              <a:buNone/>
+            </a:pPr>
+            <a:r>
+              <a:rPr lang="en-GB" sz="1000" dirty="0" smtClean="0"/>
+              <a:t>(Sonar/</a:t>
+            </a:r>
+            <a:r>
+              <a:rPr lang="en-GB" sz="1000" dirty="0" err="1" smtClean="0"/>
+              <a:t>Snyk</a:t>
+            </a:r>
+            <a:r>
+              <a:rPr lang="en-GB" sz="1000" dirty="0" smtClean="0"/>
+              <a:t>)</a:t>
             </a:r>
             <a:endParaRPr sz="1000" dirty="0"/>
           </a:p>
@@ -6093,8 +6163,8 @@
         </p:nvSpPr>
         <p:spPr>
           <a:xfrm>
-            <a:off x="7560056" y="3239436"/>
-            <a:ext cx="1195001" cy="597600"/>
+            <a:off x="7361500" y="3169350"/>
+            <a:ext cx="1551006" cy="667686"/>
           </a:xfrm>
           <a:prstGeom prst="rect">
             <a:avLst/>
@@ -6123,11 +6193,42 @@
             </a:pPr>
             <a:r>
               <a:rPr lang="en-GB" sz="1000" dirty="0" smtClean="0"/>
-              <a:t>Post Deployment </a:t>
+              <a:t>Post Deployment Configuration </a:t>
             </a:r>
             <a:r>
-              <a:rPr lang="en-GB" sz="1000" smtClean="0"/>
-              <a:t>Configuration Scan</a:t>
+              <a:rPr lang="en-GB" sz="1000" dirty="0" smtClean="0"/>
+              <a:t>Scan</a:t>
+            </a:r>
+          </a:p>
+          <a:p>
+            <a:pPr marL="0" lvl="0" indent="0" algn="ctr" rtl="0">
+              <a:spcBef>
+                <a:spcPts val="0"/>
+              </a:spcBef>
+              <a:spcAft>
+                <a:spcPts val="0"/>
+              </a:spcAft>
+              <a:buNone/>
+            </a:pPr>
+            <a:r>
+              <a:rPr lang="en-GB" sz="1000" dirty="0" smtClean="0"/>
+              <a:t>(AWS </a:t>
+            </a:r>
+            <a:r>
+              <a:rPr lang="en-GB" sz="1000" dirty="0" err="1" smtClean="0"/>
+              <a:t>Config</a:t>
+            </a:r>
+            <a:r>
+              <a:rPr lang="en-GB" sz="1000" dirty="0" smtClean="0"/>
+              <a:t>, Inspector, </a:t>
+            </a:r>
+            <a:r>
+              <a:rPr lang="en-GB" sz="1000" dirty="0" err="1" smtClean="0"/>
+              <a:t>SecurityHub</a:t>
+            </a:r>
+            <a:r>
+              <a:rPr lang="en-GB" sz="1000" dirty="0" smtClean="0"/>
+              <a:t>)</a:t>
             </a:r>
             <a:endParaRPr sz="1000" dirty="0"/>
           </a:p>

</xml_diff>